<commit_message>
I UNDERSTAND HOW COMPUTERS WORK
</commit_message>
<xml_diff>
--- a/Documents/Final Presentation/Nutrition App.pptx
+++ b/Documents/Final Presentation/Nutrition App.pptx
@@ -4,19 +4,23 @@
   <p:sldMasterIdLst>
     <p:sldMasterId id="2147483660" r:id="rId1"/>
   </p:sldMasterIdLst>
+  <p:notesMasterIdLst>
+    <p:notesMasterId r:id="rId15"/>
+  </p:notesMasterIdLst>
   <p:sldIdLst>
     <p:sldId id="256" r:id="rId2"/>
     <p:sldId id="257" r:id="rId3"/>
     <p:sldId id="261" r:id="rId4"/>
     <p:sldId id="258" r:id="rId5"/>
     <p:sldId id="259" r:id="rId6"/>
-    <p:sldId id="260" r:id="rId7"/>
-    <p:sldId id="262" r:id="rId8"/>
-    <p:sldId id="264" r:id="rId9"/>
-    <p:sldId id="265" r:id="rId10"/>
-    <p:sldId id="266" r:id="rId11"/>
-    <p:sldId id="263" r:id="rId12"/>
-    <p:sldId id="267" r:id="rId13"/>
+    <p:sldId id="269" r:id="rId7"/>
+    <p:sldId id="270" r:id="rId8"/>
+    <p:sldId id="268" r:id="rId9"/>
+    <p:sldId id="262" r:id="rId10"/>
+    <p:sldId id="264" r:id="rId11"/>
+    <p:sldId id="266" r:id="rId12"/>
+    <p:sldId id="263" r:id="rId13"/>
+    <p:sldId id="260" r:id="rId14"/>
   </p:sldIdLst>
   <p:sldSz cx="9144000" cy="6858000" type="screen4x3"/>
   <p:notesSz cx="6858000" cy="9144000"/>
@@ -116,6 +120,434 @@
     </a:lvl9pPr>
   </p:defaultTextStyle>
 </p:presentation>
+</file>
+
+<file path=ppt/notesMasters/notesMaster1.xml><?xml version="1.0" encoding="utf-8"?>
+<p:notesMaster xmlns:a="http://schemas.openxmlformats.org/drawingml/2006/main" xmlns:r="http://schemas.openxmlformats.org/officeDocument/2006/relationships" xmlns:p="http://schemas.openxmlformats.org/presentationml/2006/main">
+  <p:cSld>
+    <p:bg>
+      <p:bgRef idx="1001">
+        <a:schemeClr val="bg1"/>
+      </p:bgRef>
+    </p:bg>
+    <p:spTree>
+      <p:nvGrpSpPr>
+        <p:cNvPr id="1" name=""/>
+        <p:cNvGrpSpPr/>
+        <p:nvPr/>
+      </p:nvGrpSpPr>
+      <p:grpSpPr>
+        <a:xfrm>
+          <a:off x="0" y="0"/>
+          <a:ext cx="0" cy="0"/>
+          <a:chOff x="0" y="0"/>
+          <a:chExt cx="0" cy="0"/>
+        </a:xfrm>
+      </p:grpSpPr>
+      <p:sp>
+        <p:nvSpPr>
+          <p:cNvPr id="2" name="Header Placeholder 1"/>
+          <p:cNvSpPr>
+            <a:spLocks noGrp="1"/>
+          </p:cNvSpPr>
+          <p:nvPr>
+            <p:ph type="hdr" sz="quarter"/>
+          </p:nvPr>
+        </p:nvSpPr>
+        <p:spPr>
+          <a:xfrm>
+            <a:off x="0" y="0"/>
+            <a:ext cx="2971800" cy="457200"/>
+          </a:xfrm>
+          <a:prstGeom prst="rect">
+            <a:avLst/>
+          </a:prstGeom>
+        </p:spPr>
+        <p:txBody>
+          <a:bodyPr vert="horz" lIns="91440" tIns="45720" rIns="91440" bIns="45720" rtlCol="0"/>
+          <a:lstStyle>
+            <a:lvl1pPr algn="l">
+              <a:defRPr sz="1200"/>
+            </a:lvl1pPr>
+          </a:lstStyle>
+          <a:p>
+            <a:endParaRPr lang="en-US"/>
+          </a:p>
+        </p:txBody>
+      </p:sp>
+      <p:sp>
+        <p:nvSpPr>
+          <p:cNvPr id="3" name="Date Placeholder 2"/>
+          <p:cNvSpPr>
+            <a:spLocks noGrp="1"/>
+          </p:cNvSpPr>
+          <p:nvPr>
+            <p:ph type="dt" idx="1"/>
+          </p:nvPr>
+        </p:nvSpPr>
+        <p:spPr>
+          <a:xfrm>
+            <a:off x="3884613" y="0"/>
+            <a:ext cx="2971800" cy="457200"/>
+          </a:xfrm>
+          <a:prstGeom prst="rect">
+            <a:avLst/>
+          </a:prstGeom>
+        </p:spPr>
+        <p:txBody>
+          <a:bodyPr vert="horz" lIns="91440" tIns="45720" rIns="91440" bIns="45720" rtlCol="0"/>
+          <a:lstStyle>
+            <a:lvl1pPr algn="r">
+              <a:defRPr sz="1200"/>
+            </a:lvl1pPr>
+          </a:lstStyle>
+          <a:p>
+            <a:fld id="{839B76DC-F593-42B8-88B1-074EBE1C916B}" type="datetimeFigureOut">
+              <a:rPr lang="en-US" smtClean="0"/>
+              <a:t>5/17/2012</a:t>
+            </a:fld>
+            <a:endParaRPr lang="en-US"/>
+          </a:p>
+        </p:txBody>
+      </p:sp>
+      <p:sp>
+        <p:nvSpPr>
+          <p:cNvPr id="4" name="Slide Image Placeholder 3"/>
+          <p:cNvSpPr>
+            <a:spLocks noGrp="1" noRot="1" noChangeAspect="1"/>
+          </p:cNvSpPr>
+          <p:nvPr>
+            <p:ph type="sldImg" idx="2"/>
+          </p:nvPr>
+        </p:nvSpPr>
+        <p:spPr>
+          <a:xfrm>
+            <a:off x="1143000" y="685800"/>
+            <a:ext cx="4572000" cy="3429000"/>
+          </a:xfrm>
+          <a:prstGeom prst="rect">
+            <a:avLst/>
+          </a:prstGeom>
+          <a:noFill/>
+          <a:ln w="12700">
+            <a:solidFill>
+              <a:prstClr val="black"/>
+            </a:solidFill>
+          </a:ln>
+        </p:spPr>
+        <p:txBody>
+          <a:bodyPr vert="horz" lIns="91440" tIns="45720" rIns="91440" bIns="45720" rtlCol="0" anchor="ctr"/>
+          <a:lstStyle/>
+          <a:p>
+            <a:endParaRPr lang="en-US"/>
+          </a:p>
+        </p:txBody>
+      </p:sp>
+      <p:sp>
+        <p:nvSpPr>
+          <p:cNvPr id="5" name="Notes Placeholder 4"/>
+          <p:cNvSpPr>
+            <a:spLocks noGrp="1"/>
+          </p:cNvSpPr>
+          <p:nvPr>
+            <p:ph type="body" sz="quarter" idx="3"/>
+          </p:nvPr>
+        </p:nvSpPr>
+        <p:spPr>
+          <a:xfrm>
+            <a:off x="685800" y="4343400"/>
+            <a:ext cx="5486400" cy="4114800"/>
+          </a:xfrm>
+          <a:prstGeom prst="rect">
+            <a:avLst/>
+          </a:prstGeom>
+        </p:spPr>
+        <p:txBody>
+          <a:bodyPr vert="horz" lIns="91440" tIns="45720" rIns="91440" bIns="45720" rtlCol="0">
+            <a:normAutofit/>
+          </a:bodyPr>
+          <a:lstStyle/>
+          <a:p>
+            <a:pPr lvl="0"/>
+            <a:r>
+              <a:rPr lang="en-US" smtClean="0"/>
+              <a:t>Click to edit Master text styles</a:t>
+            </a:r>
+          </a:p>
+          <a:p>
+            <a:pPr lvl="1"/>
+            <a:r>
+              <a:rPr lang="en-US" smtClean="0"/>
+              <a:t>Second level</a:t>
+            </a:r>
+          </a:p>
+          <a:p>
+            <a:pPr lvl="2"/>
+            <a:r>
+              <a:rPr lang="en-US" smtClean="0"/>
+              <a:t>Third level</a:t>
+            </a:r>
+          </a:p>
+          <a:p>
+            <a:pPr lvl="3"/>
+            <a:r>
+              <a:rPr lang="en-US" smtClean="0"/>
+              <a:t>Fourth level</a:t>
+            </a:r>
+          </a:p>
+          <a:p>
+            <a:pPr lvl="4"/>
+            <a:r>
+              <a:rPr lang="en-US" smtClean="0"/>
+              <a:t>Fifth level</a:t>
+            </a:r>
+            <a:endParaRPr lang="en-US"/>
+          </a:p>
+        </p:txBody>
+      </p:sp>
+      <p:sp>
+        <p:nvSpPr>
+          <p:cNvPr id="6" name="Footer Placeholder 5"/>
+          <p:cNvSpPr>
+            <a:spLocks noGrp="1"/>
+          </p:cNvSpPr>
+          <p:nvPr>
+            <p:ph type="ftr" sz="quarter" idx="4"/>
+          </p:nvPr>
+        </p:nvSpPr>
+        <p:spPr>
+          <a:xfrm>
+            <a:off x="0" y="8685213"/>
+            <a:ext cx="2971800" cy="457200"/>
+          </a:xfrm>
+          <a:prstGeom prst="rect">
+            <a:avLst/>
+          </a:prstGeom>
+        </p:spPr>
+        <p:txBody>
+          <a:bodyPr vert="horz" lIns="91440" tIns="45720" rIns="91440" bIns="45720" rtlCol="0" anchor="b"/>
+          <a:lstStyle>
+            <a:lvl1pPr algn="l">
+              <a:defRPr sz="1200"/>
+            </a:lvl1pPr>
+          </a:lstStyle>
+          <a:p>
+            <a:endParaRPr lang="en-US"/>
+          </a:p>
+        </p:txBody>
+      </p:sp>
+      <p:sp>
+        <p:nvSpPr>
+          <p:cNvPr id="7" name="Slide Number Placeholder 6"/>
+          <p:cNvSpPr>
+            <a:spLocks noGrp="1"/>
+          </p:cNvSpPr>
+          <p:nvPr>
+            <p:ph type="sldNum" sz="quarter" idx="5"/>
+          </p:nvPr>
+        </p:nvSpPr>
+        <p:spPr>
+          <a:xfrm>
+            <a:off x="3884613" y="8685213"/>
+            <a:ext cx="2971800" cy="457200"/>
+          </a:xfrm>
+          <a:prstGeom prst="rect">
+            <a:avLst/>
+          </a:prstGeom>
+        </p:spPr>
+        <p:txBody>
+          <a:bodyPr vert="horz" lIns="91440" tIns="45720" rIns="91440" bIns="45720" rtlCol="0" anchor="b"/>
+          <a:lstStyle>
+            <a:lvl1pPr algn="r">
+              <a:defRPr sz="1200"/>
+            </a:lvl1pPr>
+          </a:lstStyle>
+          <a:p>
+            <a:fld id="{DAE04F57-64A3-48DE-8688-2BE887229CC3}" type="slidenum">
+              <a:rPr lang="en-US" smtClean="0"/>
+              <a:t>‹#›</a:t>
+            </a:fld>
+            <a:endParaRPr lang="en-US"/>
+          </a:p>
+        </p:txBody>
+      </p:sp>
+    </p:spTree>
+  </p:cSld>
+  <p:clrMap bg1="lt1" tx1="dk1" bg2="lt2" tx2="dk2" accent1="accent1" accent2="accent2" accent3="accent3" accent4="accent4" accent5="accent5" accent6="accent6" hlink="hlink" folHlink="folHlink"/>
+  <p:notesStyle>
+    <a:lvl1pPr marL="0" algn="l" defTabSz="914400" rtl="0" eaLnBrk="1" latinLnBrk="0" hangingPunct="1">
+      <a:defRPr sz="1200" kern="1200">
+        <a:solidFill>
+          <a:schemeClr val="tx1"/>
+        </a:solidFill>
+        <a:latin typeface="+mn-lt"/>
+        <a:ea typeface="+mn-ea"/>
+        <a:cs typeface="+mn-cs"/>
+      </a:defRPr>
+    </a:lvl1pPr>
+    <a:lvl2pPr marL="457200" algn="l" defTabSz="914400" rtl="0" eaLnBrk="1" latinLnBrk="0" hangingPunct="1">
+      <a:defRPr sz="1200" kern="1200">
+        <a:solidFill>
+          <a:schemeClr val="tx1"/>
+        </a:solidFill>
+        <a:latin typeface="+mn-lt"/>
+        <a:ea typeface="+mn-ea"/>
+        <a:cs typeface="+mn-cs"/>
+      </a:defRPr>
+    </a:lvl2pPr>
+    <a:lvl3pPr marL="914400" algn="l" defTabSz="914400" rtl="0" eaLnBrk="1" latinLnBrk="0" hangingPunct="1">
+      <a:defRPr sz="1200" kern="1200">
+        <a:solidFill>
+          <a:schemeClr val="tx1"/>
+        </a:solidFill>
+        <a:latin typeface="+mn-lt"/>
+        <a:ea typeface="+mn-ea"/>
+        <a:cs typeface="+mn-cs"/>
+      </a:defRPr>
+    </a:lvl3pPr>
+    <a:lvl4pPr marL="1371600" algn="l" defTabSz="914400" rtl="0" eaLnBrk="1" latinLnBrk="0" hangingPunct="1">
+      <a:defRPr sz="1200" kern="1200">
+        <a:solidFill>
+          <a:schemeClr val="tx1"/>
+        </a:solidFill>
+        <a:latin typeface="+mn-lt"/>
+        <a:ea typeface="+mn-ea"/>
+        <a:cs typeface="+mn-cs"/>
+      </a:defRPr>
+    </a:lvl4pPr>
+    <a:lvl5pPr marL="1828800" algn="l" defTabSz="914400" rtl="0" eaLnBrk="1" latinLnBrk="0" hangingPunct="1">
+      <a:defRPr sz="1200" kern="1200">
+        <a:solidFill>
+          <a:schemeClr val="tx1"/>
+        </a:solidFill>
+        <a:latin typeface="+mn-lt"/>
+        <a:ea typeface="+mn-ea"/>
+        <a:cs typeface="+mn-cs"/>
+      </a:defRPr>
+    </a:lvl5pPr>
+    <a:lvl6pPr marL="2286000" algn="l" defTabSz="914400" rtl="0" eaLnBrk="1" latinLnBrk="0" hangingPunct="1">
+      <a:defRPr sz="1200" kern="1200">
+        <a:solidFill>
+          <a:schemeClr val="tx1"/>
+        </a:solidFill>
+        <a:latin typeface="+mn-lt"/>
+        <a:ea typeface="+mn-ea"/>
+        <a:cs typeface="+mn-cs"/>
+      </a:defRPr>
+    </a:lvl6pPr>
+    <a:lvl7pPr marL="2743200" algn="l" defTabSz="914400" rtl="0" eaLnBrk="1" latinLnBrk="0" hangingPunct="1">
+      <a:defRPr sz="1200" kern="1200">
+        <a:solidFill>
+          <a:schemeClr val="tx1"/>
+        </a:solidFill>
+        <a:latin typeface="+mn-lt"/>
+        <a:ea typeface="+mn-ea"/>
+        <a:cs typeface="+mn-cs"/>
+      </a:defRPr>
+    </a:lvl7pPr>
+    <a:lvl8pPr marL="3200400" algn="l" defTabSz="914400" rtl="0" eaLnBrk="1" latinLnBrk="0" hangingPunct="1">
+      <a:defRPr sz="1200" kern="1200">
+        <a:solidFill>
+          <a:schemeClr val="tx1"/>
+        </a:solidFill>
+        <a:latin typeface="+mn-lt"/>
+        <a:ea typeface="+mn-ea"/>
+        <a:cs typeface="+mn-cs"/>
+      </a:defRPr>
+    </a:lvl8pPr>
+    <a:lvl9pPr marL="3657600" algn="l" defTabSz="914400" rtl="0" eaLnBrk="1" latinLnBrk="0" hangingPunct="1">
+      <a:defRPr sz="1200" kern="1200">
+        <a:solidFill>
+          <a:schemeClr val="tx1"/>
+        </a:solidFill>
+        <a:latin typeface="+mn-lt"/>
+        <a:ea typeface="+mn-ea"/>
+        <a:cs typeface="+mn-cs"/>
+      </a:defRPr>
+    </a:lvl9pPr>
+  </p:notesStyle>
+</p:notesMaster>
+</file>
+
+<file path=ppt/notesSlides/notesSlide1.xml><?xml version="1.0" encoding="utf-8"?>
+<p:notes xmlns:a="http://schemas.openxmlformats.org/drawingml/2006/main" xmlns:r="http://schemas.openxmlformats.org/officeDocument/2006/relationships" xmlns:p="http://schemas.openxmlformats.org/presentationml/2006/main">
+  <p:cSld>
+    <p:spTree>
+      <p:nvGrpSpPr>
+        <p:cNvPr id="1" name=""/>
+        <p:cNvGrpSpPr/>
+        <p:nvPr/>
+      </p:nvGrpSpPr>
+      <p:grpSpPr>
+        <a:xfrm>
+          <a:off x="0" y="0"/>
+          <a:ext cx="0" cy="0"/>
+          <a:chOff x="0" y="0"/>
+          <a:chExt cx="0" cy="0"/>
+        </a:xfrm>
+      </p:grpSpPr>
+      <p:sp>
+        <p:nvSpPr>
+          <p:cNvPr id="2" name="Slide Image Placeholder 1"/>
+          <p:cNvSpPr>
+            <a:spLocks noGrp="1" noRot="1" noChangeAspect="1"/>
+          </p:cNvSpPr>
+          <p:nvPr>
+            <p:ph type="sldImg"/>
+          </p:nvPr>
+        </p:nvSpPr>
+        <p:spPr/>
+      </p:sp>
+      <p:sp>
+        <p:nvSpPr>
+          <p:cNvPr id="3" name="Notes Placeholder 2"/>
+          <p:cNvSpPr>
+            <a:spLocks noGrp="1"/>
+          </p:cNvSpPr>
+          <p:nvPr>
+            <p:ph type="body" idx="1"/>
+          </p:nvPr>
+        </p:nvSpPr>
+        <p:spPr/>
+        <p:txBody>
+          <a:bodyPr>
+            <a:normAutofit/>
+          </a:bodyPr>
+          <a:lstStyle/>
+          <a:p>
+            <a:endParaRPr lang="en-US" dirty="0"/>
+          </a:p>
+        </p:txBody>
+      </p:sp>
+      <p:sp>
+        <p:nvSpPr>
+          <p:cNvPr id="4" name="Slide Number Placeholder 3"/>
+          <p:cNvSpPr>
+            <a:spLocks noGrp="1"/>
+          </p:cNvSpPr>
+          <p:nvPr>
+            <p:ph type="sldNum" sz="quarter" idx="10"/>
+          </p:nvPr>
+        </p:nvSpPr>
+        <p:spPr/>
+        <p:txBody>
+          <a:bodyPr/>
+          <a:lstStyle/>
+          <a:p>
+            <a:fld id="{DAE04F57-64A3-48DE-8688-2BE887229CC3}" type="slidenum">
+              <a:rPr lang="en-US" smtClean="0"/>
+              <a:t>2</a:t>
+            </a:fld>
+            <a:endParaRPr lang="en-US"/>
+          </a:p>
+        </p:txBody>
+      </p:sp>
+    </p:spTree>
+  </p:cSld>
+  <p:clrMapOvr>
+    <a:masterClrMapping/>
+  </p:clrMapOvr>
+</p:notes>
 </file>
 
 <file path=ppt/slideLayouts/slideLayout1.xml><?xml version="1.0" encoding="utf-8"?>
@@ -2875,7 +3307,8 @@
           <a:p>
             <a:fld id="{3CA114B5-5236-43EC-ABAC-F375D508C810}" type="datetimeFigureOut">
               <a:rPr lang="en-US" smtClean="0"/>
-              <a:t>5/14/2012</a:t>
+              <a:pPr/>
+              <a:t>5/17/2012</a:t>
             </a:fld>
             <a:endParaRPr lang="en-US"/>
           </a:p>
@@ -2991,6 +3424,7 @@
           <a:p>
             <a:fld id="{BBA605AC-4621-44C1-B9D2-119FBD88D551}" type="slidenum">
               <a:rPr lang="en-US" smtClean="0"/>
+              <a:pPr/>
               <a:t>‹#›</a:t>
             </a:fld>
             <a:endParaRPr lang="en-US"/>
@@ -3160,7 +3594,8 @@
           <a:p>
             <a:fld id="{3CA114B5-5236-43EC-ABAC-F375D508C810}" type="datetimeFigureOut">
               <a:rPr lang="en-US" smtClean="0"/>
-              <a:t>5/14/2012</a:t>
+              <a:pPr/>
+              <a:t>5/17/2012</a:t>
             </a:fld>
             <a:endParaRPr lang="en-US"/>
           </a:p>
@@ -3202,6 +3637,7 @@
           <a:p>
             <a:fld id="{BBA605AC-4621-44C1-B9D2-119FBD88D551}" type="slidenum">
               <a:rPr lang="en-US" smtClean="0"/>
+              <a:pPr/>
               <a:t>‹#›</a:t>
             </a:fld>
             <a:endParaRPr lang="en-US"/>
@@ -3335,7 +3771,8 @@
           <a:p>
             <a:fld id="{3CA114B5-5236-43EC-ABAC-F375D508C810}" type="datetimeFigureOut">
               <a:rPr lang="en-US" smtClean="0"/>
-              <a:t>5/14/2012</a:t>
+              <a:pPr/>
+              <a:t>5/17/2012</a:t>
             </a:fld>
             <a:endParaRPr lang="en-US"/>
           </a:p>
@@ -3377,6 +3814,7 @@
           <a:p>
             <a:fld id="{BBA605AC-4621-44C1-B9D2-119FBD88D551}" type="slidenum">
               <a:rPr lang="en-US" smtClean="0"/>
+              <a:pPr/>
               <a:t>‹#›</a:t>
             </a:fld>
             <a:endParaRPr lang="en-US"/>
@@ -3500,7 +3938,8 @@
           <a:p>
             <a:fld id="{3CA114B5-5236-43EC-ABAC-F375D508C810}" type="datetimeFigureOut">
               <a:rPr lang="en-US" smtClean="0"/>
-              <a:t>5/14/2012</a:t>
+              <a:pPr/>
+              <a:t>5/17/2012</a:t>
             </a:fld>
             <a:endParaRPr lang="en-US"/>
           </a:p>
@@ -3542,6 +3981,7 @@
           <a:p>
             <a:fld id="{BBA605AC-4621-44C1-B9D2-119FBD88D551}" type="slidenum">
               <a:rPr lang="en-US" smtClean="0"/>
+              <a:pPr/>
               <a:t>‹#›</a:t>
             </a:fld>
             <a:endParaRPr lang="en-US"/>
@@ -3741,7 +4181,8 @@
           <a:p>
             <a:fld id="{3CA114B5-5236-43EC-ABAC-F375D508C810}" type="datetimeFigureOut">
               <a:rPr lang="en-US" smtClean="0"/>
-              <a:t>5/14/2012</a:t>
+              <a:pPr/>
+              <a:t>5/17/2012</a:t>
             </a:fld>
             <a:endParaRPr lang="en-US"/>
           </a:p>
@@ -3783,6 +4224,7 @@
           <a:p>
             <a:fld id="{BBA605AC-4621-44C1-B9D2-119FBD88D551}" type="slidenum">
               <a:rPr lang="en-US" smtClean="0"/>
+              <a:pPr/>
               <a:t>‹#›</a:t>
             </a:fld>
             <a:endParaRPr lang="en-US"/>
@@ -3854,7 +4296,8 @@
           <a:p>
             <a:fld id="{3CA114B5-5236-43EC-ABAC-F375D508C810}" type="datetimeFigureOut">
               <a:rPr lang="en-US" smtClean="0"/>
-              <a:t>5/14/2012</a:t>
+              <a:pPr/>
+              <a:t>5/17/2012</a:t>
             </a:fld>
             <a:endParaRPr lang="en-US"/>
           </a:p>
@@ -3896,6 +4339,7 @@
           <a:p>
             <a:fld id="{BBA605AC-4621-44C1-B9D2-119FBD88D551}" type="slidenum">
               <a:rPr lang="en-US" smtClean="0"/>
+              <a:pPr/>
               <a:t>‹#›</a:t>
             </a:fld>
             <a:endParaRPr lang="en-US"/>
@@ -4393,7 +4837,8 @@
           <a:p>
             <a:fld id="{3CA114B5-5236-43EC-ABAC-F375D508C810}" type="datetimeFigureOut">
               <a:rPr lang="en-US" smtClean="0"/>
-              <a:t>5/14/2012</a:t>
+              <a:pPr/>
+              <a:t>5/17/2012</a:t>
             </a:fld>
             <a:endParaRPr lang="en-US"/>
           </a:p>
@@ -4435,6 +4880,7 @@
           <a:p>
             <a:fld id="{BBA605AC-4621-44C1-B9D2-119FBD88D551}" type="slidenum">
               <a:rPr lang="en-US" smtClean="0"/>
+              <a:pPr/>
               <a:t>‹#›</a:t>
             </a:fld>
             <a:endParaRPr lang="en-US"/>
@@ -4506,7 +4952,8 @@
           <a:p>
             <a:fld id="{3CA114B5-5236-43EC-ABAC-F375D508C810}" type="datetimeFigureOut">
               <a:rPr lang="en-US" smtClean="0"/>
-              <a:t>5/14/2012</a:t>
+              <a:pPr/>
+              <a:t>5/17/2012</a:t>
             </a:fld>
             <a:endParaRPr lang="en-US"/>
           </a:p>
@@ -4548,6 +4995,7 @@
           <a:p>
             <a:fld id="{BBA605AC-4621-44C1-B9D2-119FBD88D551}" type="slidenum">
               <a:rPr lang="en-US" smtClean="0"/>
+              <a:pPr/>
               <a:t>‹#›</a:t>
             </a:fld>
             <a:endParaRPr lang="en-US"/>
@@ -4596,7 +5044,8 @@
           <a:p>
             <a:fld id="{3CA114B5-5236-43EC-ABAC-F375D508C810}" type="datetimeFigureOut">
               <a:rPr lang="en-US" smtClean="0"/>
-              <a:t>5/14/2012</a:t>
+              <a:pPr/>
+              <a:t>5/17/2012</a:t>
             </a:fld>
             <a:endParaRPr lang="en-US"/>
           </a:p>
@@ -4638,6 +5087,7 @@
           <a:p>
             <a:fld id="{BBA605AC-4621-44C1-B9D2-119FBD88D551}" type="slidenum">
               <a:rPr lang="en-US" smtClean="0"/>
+              <a:pPr/>
               <a:t>‹#›</a:t>
             </a:fld>
             <a:endParaRPr lang="en-US"/>
@@ -7247,7 +7697,8 @@
           <a:p>
             <a:fld id="{3CA114B5-5236-43EC-ABAC-F375D508C810}" type="datetimeFigureOut">
               <a:rPr lang="en-US" smtClean="0"/>
-              <a:t>5/14/2012</a:t>
+              <a:pPr/>
+              <a:t>5/17/2012</a:t>
             </a:fld>
             <a:endParaRPr lang="en-US"/>
           </a:p>
@@ -7270,6 +7721,7 @@
           <a:p>
             <a:fld id="{BBA605AC-4621-44C1-B9D2-119FBD88D551}" type="slidenum">
               <a:rPr lang="en-US" smtClean="0"/>
+              <a:pPr/>
               <a:t>‹#›</a:t>
             </a:fld>
             <a:endParaRPr lang="en-US"/>
@@ -10459,7 +10911,8 @@
           <a:p>
             <a:fld id="{3CA114B5-5236-43EC-ABAC-F375D508C810}" type="datetimeFigureOut">
               <a:rPr lang="en-US" smtClean="0"/>
-              <a:t>5/14/2012</a:t>
+              <a:pPr/>
+              <a:t>5/17/2012</a:t>
             </a:fld>
             <a:endParaRPr lang="en-US"/>
           </a:p>
@@ -10508,6 +10961,7 @@
           <a:p>
             <a:fld id="{BBA605AC-4621-44C1-B9D2-119FBD88D551}" type="slidenum">
               <a:rPr lang="en-US" smtClean="0"/>
+              <a:pPr/>
               <a:t>‹#›</a:t>
             </a:fld>
             <a:endParaRPr lang="en-US"/>
@@ -13281,7 +13735,8 @@
           <a:p>
             <a:fld id="{3CA114B5-5236-43EC-ABAC-F375D508C810}" type="datetimeFigureOut">
               <a:rPr lang="en-US" smtClean="0"/>
-              <a:t>5/14/2012</a:t>
+              <a:pPr/>
+              <a:t>5/17/2012</a:t>
             </a:fld>
             <a:endParaRPr lang="en-US"/>
           </a:p>
@@ -13355,6 +13810,7 @@
           <a:p>
             <a:fld id="{BBA605AC-4621-44C1-B9D2-119FBD88D551}" type="slidenum">
               <a:rPr lang="en-US" smtClean="0"/>
+              <a:pPr/>
               <a:t>‹#›</a:t>
             </a:fld>
             <a:endParaRPr lang="en-US"/>
@@ -13800,7 +14256,7 @@
     </p:spTree>
     <p:extLst>
       <p:ext uri="{BB962C8B-B14F-4D97-AF65-F5344CB8AC3E}">
-        <p14:creationId xmlns:p14="http://schemas.microsoft.com/office/powerpoint/2010/main" val="258588559"/>
+        <p14:creationId xmlns:p14="http://schemas.microsoft.com/office/powerpoint/2010/main" xmlns="" val="258588559"/>
       </p:ext>
     </p:extLst>
   </p:cSld>
@@ -13843,12 +14299,8 @@
           <a:lstStyle/>
           <a:p>
             <a:r>
-              <a:rPr lang="en-US" dirty="0" err="1" smtClean="0"/>
-              <a:t>Moar</a:t>
-            </a:r>
-            <a:r>
               <a:rPr lang="en-US" dirty="0" smtClean="0"/>
-              <a:t> metrics</a:t>
+              <a:t>Metrics</a:t>
             </a:r>
             <a:endParaRPr lang="en-US" dirty="0"/>
           </a:p>
@@ -13866,17 +14318,111 @@
         </p:nvSpPr>
         <p:spPr/>
         <p:txBody>
-          <a:bodyPr/>
+          <a:bodyPr>
+            <a:normAutofit fontScale="77500" lnSpcReduction="20000"/>
+          </a:bodyPr>
           <a:lstStyle/>
           <a:p>
-            <a:endParaRPr lang="en-US"/>
+            <a:r>
+              <a:rPr lang="en-US" dirty="0" smtClean="0"/>
+              <a:t>Method lines of code</a:t>
+            </a:r>
+          </a:p>
+          <a:p>
+            <a:pPr lvl="1"/>
+            <a:r>
+              <a:rPr lang="en-US" dirty="0" smtClean="0"/>
+              <a:t>Keep code clean and manageable</a:t>
+            </a:r>
+            <a:endParaRPr lang="en-US" dirty="0" smtClean="0"/>
+          </a:p>
+          <a:p>
+            <a:r>
+              <a:rPr lang="en-US" dirty="0" err="1" smtClean="0"/>
+              <a:t>Cyclomatic</a:t>
+            </a:r>
+            <a:r>
+              <a:rPr lang="en-US" dirty="0" smtClean="0"/>
+              <a:t> complexity</a:t>
+            </a:r>
+          </a:p>
+          <a:p>
+            <a:pPr lvl="1"/>
+            <a:r>
+              <a:rPr lang="en-US" dirty="0" smtClean="0"/>
+              <a:t>Keep code simple</a:t>
+            </a:r>
+          </a:p>
+          <a:p>
+            <a:r>
+              <a:rPr lang="en-US" dirty="0" smtClean="0"/>
+              <a:t>Depth of inheritance</a:t>
+            </a:r>
+          </a:p>
+          <a:p>
+            <a:pPr lvl="1"/>
+            <a:r>
+              <a:rPr lang="en-US" dirty="0" smtClean="0"/>
+              <a:t>Keep design simple</a:t>
+            </a:r>
+          </a:p>
+          <a:p>
+            <a:r>
+              <a:rPr lang="en-US" dirty="0" smtClean="0"/>
+              <a:t>Nested block depth</a:t>
+            </a:r>
+          </a:p>
+          <a:p>
+            <a:pPr lvl="1"/>
+            <a:r>
+              <a:rPr lang="en-US" dirty="0" smtClean="0"/>
+              <a:t>Break up code if needed</a:t>
+            </a:r>
+          </a:p>
+          <a:p>
+            <a:r>
+              <a:rPr lang="en-US" dirty="0" smtClean="0"/>
+              <a:t>Afferent coupling</a:t>
+            </a:r>
+          </a:p>
+          <a:p>
+            <a:pPr lvl="1"/>
+            <a:r>
+              <a:rPr lang="en-US" dirty="0" smtClean="0"/>
+              <a:t>Keep design </a:t>
+            </a:r>
+            <a:r>
+              <a:rPr lang="en-US" dirty="0" smtClean="0"/>
+              <a:t>s</a:t>
+            </a:r>
+            <a:r>
+              <a:rPr lang="en-US" dirty="0" smtClean="0"/>
+              <a:t>imple</a:t>
+            </a:r>
+          </a:p>
+          <a:p>
+            <a:r>
+              <a:rPr lang="en-US" dirty="0" smtClean="0"/>
+              <a:t>Lines of code</a:t>
+            </a:r>
+          </a:p>
+          <a:p>
+            <a:pPr lvl="1"/>
+            <a:r>
+              <a:rPr lang="en-US" dirty="0" smtClean="0"/>
+              <a:t>Track project growth</a:t>
+            </a:r>
+            <a:endParaRPr lang="en-US" dirty="0" smtClean="0"/>
+          </a:p>
+          <a:p>
+            <a:endParaRPr lang="en-US" dirty="0"/>
           </a:p>
         </p:txBody>
       </p:sp>
     </p:spTree>
     <p:extLst>
       <p:ext uri="{BB962C8B-B14F-4D97-AF65-F5344CB8AC3E}">
-        <p14:creationId xmlns:p14="http://schemas.microsoft.com/office/powerpoint/2010/main" val="651972016"/>
+        <p14:creationId xmlns:p14="http://schemas.microsoft.com/office/powerpoint/2010/main" xmlns="" val="2301795302"/>
       </p:ext>
     </p:extLst>
   </p:cSld>
@@ -13887,6 +14433,66 @@
 </file>
 
 <file path=ppt/slides/slide11.xml><?xml version="1.0" encoding="utf-8"?>
+<p:sld xmlns:a="http://schemas.openxmlformats.org/drawingml/2006/main" xmlns:r="http://schemas.openxmlformats.org/officeDocument/2006/relationships" xmlns:p="http://schemas.openxmlformats.org/presentationml/2006/main">
+  <p:cSld>
+    <p:spTree>
+      <p:nvGrpSpPr>
+        <p:cNvPr id="1" name=""/>
+        <p:cNvGrpSpPr/>
+        <p:nvPr/>
+      </p:nvGrpSpPr>
+      <p:grpSpPr>
+        <a:xfrm>
+          <a:off x="0" y="0"/>
+          <a:ext cx="0" cy="0"/>
+          <a:chOff x="0" y="0"/>
+          <a:chExt cx="0" cy="0"/>
+        </a:xfrm>
+      </p:grpSpPr>
+    </p:spTree>
+    <p:extLst>
+      <p:ext uri="{BB962C8B-B14F-4D97-AF65-F5344CB8AC3E}">
+        <p14:creationId xmlns:p14="http://schemas.microsoft.com/office/powerpoint/2010/main" xmlns="" val="651972016"/>
+      </p:ext>
+    </p:extLst>
+  </p:cSld>
+  <p:clrMapOvr>
+    <a:masterClrMapping/>
+  </p:clrMapOvr>
+</p:sld>
+</file>
+
+<file path=ppt/slides/slide12.xml><?xml version="1.0" encoding="utf-8"?>
+<p:sld xmlns:a="http://schemas.openxmlformats.org/drawingml/2006/main" xmlns:r="http://schemas.openxmlformats.org/officeDocument/2006/relationships" xmlns:p="http://schemas.openxmlformats.org/presentationml/2006/main">
+  <p:cSld>
+    <p:spTree>
+      <p:nvGrpSpPr>
+        <p:cNvPr id="1" name=""/>
+        <p:cNvGrpSpPr/>
+        <p:nvPr/>
+      </p:nvGrpSpPr>
+      <p:grpSpPr>
+        <a:xfrm>
+          <a:off x="0" y="0"/>
+          <a:ext cx="0" cy="0"/>
+          <a:chOff x="0" y="0"/>
+          <a:chExt cx="0" cy="0"/>
+        </a:xfrm>
+      </p:grpSpPr>
+    </p:spTree>
+    <p:extLst>
+      <p:ext uri="{BB962C8B-B14F-4D97-AF65-F5344CB8AC3E}">
+        <p14:creationId xmlns:p14="http://schemas.microsoft.com/office/powerpoint/2010/main" xmlns="" val="1591237179"/>
+      </p:ext>
+    </p:extLst>
+  </p:cSld>
+  <p:clrMapOvr>
+    <a:masterClrMapping/>
+  </p:clrMapOvr>
+</p:sld>
+</file>
+
+<file path=ppt/slides/slide13.xml><?xml version="1.0" encoding="utf-8"?>
 <p:sld xmlns:a="http://schemas.openxmlformats.org/drawingml/2006/main" xmlns:r="http://schemas.openxmlformats.org/officeDocument/2006/relationships" xmlns:p="http://schemas.openxmlformats.org/presentationml/2006/main">
   <p:cSld>
     <p:spTree>
@@ -13920,107 +14526,16 @@
           <a:p>
             <a:r>
               <a:rPr lang="en-US" dirty="0" smtClean="0"/>
-              <a:t>Metrics Diagrams</a:t>
+              <a:t>Demonstration</a:t>
             </a:r>
             <a:endParaRPr lang="en-US" dirty="0"/>
-          </a:p>
-        </p:txBody>
-      </p:sp>
-      <p:sp>
-        <p:nvSpPr>
-          <p:cNvPr id="3" name="Content Placeholder 2"/>
-          <p:cNvSpPr>
-            <a:spLocks noGrp="1"/>
-          </p:cNvSpPr>
-          <p:nvPr>
-            <p:ph idx="1"/>
-          </p:nvPr>
-        </p:nvSpPr>
-        <p:spPr/>
-        <p:txBody>
-          <a:bodyPr/>
-          <a:lstStyle/>
-          <a:p>
-            <a:endParaRPr lang="en-US"/>
           </a:p>
         </p:txBody>
       </p:sp>
     </p:spTree>
     <p:extLst>
       <p:ext uri="{BB962C8B-B14F-4D97-AF65-F5344CB8AC3E}">
-        <p14:creationId xmlns:p14="http://schemas.microsoft.com/office/powerpoint/2010/main" val="1591237179"/>
-      </p:ext>
-    </p:extLst>
-  </p:cSld>
-  <p:clrMapOvr>
-    <a:masterClrMapping/>
-  </p:clrMapOvr>
-</p:sld>
-</file>
-
-<file path=ppt/slides/slide12.xml><?xml version="1.0" encoding="utf-8"?>
-<p:sld xmlns:a="http://schemas.openxmlformats.org/drawingml/2006/main" xmlns:r="http://schemas.openxmlformats.org/officeDocument/2006/relationships" xmlns:p="http://schemas.openxmlformats.org/presentationml/2006/main">
-  <p:cSld>
-    <p:spTree>
-      <p:nvGrpSpPr>
-        <p:cNvPr id="1" name=""/>
-        <p:cNvGrpSpPr/>
-        <p:nvPr/>
-      </p:nvGrpSpPr>
-      <p:grpSpPr>
-        <a:xfrm>
-          <a:off x="0" y="0"/>
-          <a:ext cx="0" cy="0"/>
-          <a:chOff x="0" y="0"/>
-          <a:chExt cx="0" cy="0"/>
-        </a:xfrm>
-      </p:grpSpPr>
-      <p:sp>
-        <p:nvSpPr>
-          <p:cNvPr id="2" name="Title 1"/>
-          <p:cNvSpPr>
-            <a:spLocks noGrp="1"/>
-          </p:cNvSpPr>
-          <p:nvPr>
-            <p:ph type="title"/>
-          </p:nvPr>
-        </p:nvSpPr>
-        <p:spPr/>
-        <p:txBody>
-          <a:bodyPr/>
-          <a:lstStyle/>
-          <a:p>
-            <a:r>
-              <a:rPr lang="en-US" smtClean="0"/>
-              <a:t>Special Thanks</a:t>
-            </a:r>
-            <a:endParaRPr lang="en-US"/>
-          </a:p>
-        </p:txBody>
-      </p:sp>
-      <p:sp>
-        <p:nvSpPr>
-          <p:cNvPr id="3" name="Content Placeholder 2"/>
-          <p:cNvSpPr>
-            <a:spLocks noGrp="1"/>
-          </p:cNvSpPr>
-          <p:nvPr>
-            <p:ph idx="1"/>
-          </p:nvPr>
-        </p:nvSpPr>
-        <p:spPr/>
-        <p:txBody>
-          <a:bodyPr/>
-          <a:lstStyle/>
-          <a:p>
-            <a:endParaRPr lang="en-US"/>
-          </a:p>
-        </p:txBody>
-      </p:sp>
-    </p:spTree>
-    <p:extLst>
-      <p:ext uri="{BB962C8B-B14F-4D97-AF65-F5344CB8AC3E}">
-        <p14:creationId xmlns:p14="http://schemas.microsoft.com/office/powerpoint/2010/main" val="3015919822"/>
+        <p14:creationId xmlns:p14="http://schemas.microsoft.com/office/powerpoint/2010/main" xmlns="" val="868912289"/>
       </p:ext>
     </p:extLst>
   </p:cSld>
@@ -14087,28 +14602,42 @@
           <a:p>
             <a:r>
               <a:rPr lang="en-US" dirty="0" smtClean="0"/>
-              <a:t>It’s an app, for nutrition!</a:t>
+              <a:t>The core algorithm:</a:t>
             </a:r>
           </a:p>
           <a:p>
+            <a:pPr lvl="1"/>
             <a:r>
               <a:rPr lang="en-US" dirty="0" smtClean="0"/>
-              <a:t>Markov Model Description</a:t>
+              <a:t>Markov Image Modeling</a:t>
             </a:r>
+            <a:endParaRPr lang="en-US" dirty="0" smtClean="0"/>
           </a:p>
           <a:p>
             <a:r>
               <a:rPr lang="en-US" dirty="0" smtClean="0"/>
-              <a:t>System Description</a:t>
+              <a:t>Clean, simple user interface</a:t>
             </a:r>
-            <a:endParaRPr lang="en-US" dirty="0"/>
+          </a:p>
+          <a:p>
+            <a:r>
+              <a:rPr lang="en-US" dirty="0" smtClean="0"/>
+              <a:t>Mobile Android application</a:t>
+            </a:r>
+          </a:p>
+          <a:p>
+            <a:r>
+              <a:rPr lang="en-US" dirty="0" smtClean="0"/>
+              <a:t>Three-tier architecture design</a:t>
+            </a:r>
+            <a:endParaRPr lang="en-US" dirty="0" smtClean="0"/>
           </a:p>
         </p:txBody>
       </p:sp>
     </p:spTree>
     <p:extLst>
       <p:ext uri="{BB962C8B-B14F-4D97-AF65-F5344CB8AC3E}">
-        <p14:creationId xmlns:p14="http://schemas.microsoft.com/office/powerpoint/2010/main" val="4020076551"/>
+        <p14:creationId xmlns:p14="http://schemas.microsoft.com/office/powerpoint/2010/main" xmlns="" val="4020076551"/>
       </p:ext>
     </p:extLst>
   </p:cSld>
@@ -14152,7 +14681,7 @@
           <a:p>
             <a:r>
               <a:rPr lang="en-US" dirty="0" smtClean="0"/>
-              <a:t>Intro (cont.)</a:t>
+              <a:t>The Model</a:t>
             </a:r>
             <a:endParaRPr lang="en-US" dirty="0"/>
           </a:p>
@@ -14173,14 +14702,36 @@
           <a:bodyPr/>
           <a:lstStyle/>
           <a:p>
-            <a:endParaRPr lang="en-US"/>
+            <a:r>
+              <a:rPr lang="en-US" dirty="0" smtClean="0"/>
+              <a:t>Functions on the principle of conditional probability</a:t>
+            </a:r>
+          </a:p>
+          <a:p>
+            <a:r>
+              <a:rPr lang="en-US" dirty="0" smtClean="0"/>
+              <a:t>Our simple model is color-by-color based</a:t>
+            </a:r>
+          </a:p>
+          <a:p>
+            <a:r>
+              <a:rPr lang="en-US" dirty="0" smtClean="0"/>
+              <a:t>Compares pictures by their transitional probabilities</a:t>
+            </a:r>
+          </a:p>
+          <a:p>
+            <a:r>
+              <a:rPr lang="en-US" dirty="0" smtClean="0"/>
+              <a:t>Model could use improvement if project were to be continued</a:t>
+            </a:r>
+            <a:endParaRPr lang="en-US" dirty="0"/>
           </a:p>
         </p:txBody>
       </p:sp>
     </p:spTree>
     <p:extLst>
       <p:ext uri="{BB962C8B-B14F-4D97-AF65-F5344CB8AC3E}">
-        <p14:creationId xmlns:p14="http://schemas.microsoft.com/office/powerpoint/2010/main" val="3733802252"/>
+        <p14:creationId xmlns:p14="http://schemas.microsoft.com/office/powerpoint/2010/main" xmlns="" val="3733802252"/>
       </p:ext>
     </p:extLst>
   </p:cSld>
@@ -14247,14 +14798,40 @@
           <a:p>
             <a:r>
               <a:rPr lang="en-US" dirty="0" smtClean="0"/>
-              <a:t>What was our purpose?</a:t>
+              <a:t>An Android App that…</a:t>
             </a:r>
           </a:p>
           <a:p>
+            <a:pPr lvl="1"/>
             <a:r>
               <a:rPr lang="en-US" dirty="0" smtClean="0"/>
-              <a:t>What did we want to implement</a:t>
+              <a:t>Has a simple, easy to use interface</a:t>
             </a:r>
+          </a:p>
+          <a:p>
+            <a:pPr lvl="1"/>
+            <a:r>
+              <a:rPr lang="en-US" dirty="0" smtClean="0"/>
+              <a:t>Is small, and calculations are done off of the phone</a:t>
+            </a:r>
+          </a:p>
+          <a:p>
+            <a:pPr lvl="1"/>
+            <a:r>
+              <a:rPr lang="en-US" dirty="0" smtClean="0"/>
+              <a:t>Allows snapshot processing and identification</a:t>
+            </a:r>
+          </a:p>
+          <a:p>
+            <a:pPr lvl="1"/>
+            <a:r>
+              <a:rPr lang="en-US" dirty="0" smtClean="0"/>
+              <a:t>Is localized!</a:t>
+            </a:r>
+            <a:endParaRPr lang="en-US" dirty="0" smtClean="0"/>
+          </a:p>
+          <a:p>
+            <a:pPr lvl="1"/>
             <a:endParaRPr lang="en-US" dirty="0"/>
           </a:p>
         </p:txBody>
@@ -14262,7 +14839,7 @@
     </p:spTree>
     <p:extLst>
       <p:ext uri="{BB962C8B-B14F-4D97-AF65-F5344CB8AC3E}">
-        <p14:creationId xmlns:p14="http://schemas.microsoft.com/office/powerpoint/2010/main" val="2261445809"/>
+        <p14:creationId xmlns:p14="http://schemas.microsoft.com/office/powerpoint/2010/main" xmlns="" val="2261445809"/>
       </p:ext>
     </p:extLst>
   </p:cSld>
@@ -14306,7 +14883,7 @@
           <a:p>
             <a:r>
               <a:rPr lang="en-US" dirty="0" smtClean="0"/>
-              <a:t>Solution</a:t>
+              <a:t>Our Solution</a:t>
             </a:r>
             <a:endParaRPr lang="en-US" dirty="0"/>
           </a:p>
@@ -14324,25 +14901,59 @@
         </p:nvSpPr>
         <p:spPr/>
         <p:txBody>
-          <a:bodyPr/>
+          <a:bodyPr>
+            <a:normAutofit fontScale="92500" lnSpcReduction="10000"/>
+          </a:bodyPr>
           <a:lstStyle/>
           <a:p>
             <a:r>
               <a:rPr lang="en-US" dirty="0" smtClean="0"/>
-              <a:t>Describe our system, server, client, </a:t>
+              <a:t>Image processing occurs on the phone</a:t>
             </a:r>
+          </a:p>
+          <a:p>
             <a:r>
-              <a:rPr lang="en-US" dirty="0" err="1" smtClean="0"/>
-              <a:t>db</a:t>
+              <a:rPr lang="en-US" dirty="0" smtClean="0"/>
+              <a:t>Processed image model is sent to the server</a:t>
             </a:r>
             <a:endParaRPr lang="en-US" dirty="0"/>
+          </a:p>
+          <a:p>
+            <a:r>
+              <a:rPr lang="en-US" dirty="0" smtClean="0"/>
+              <a:t>Food items are retrieved from the database</a:t>
+            </a:r>
+          </a:p>
+          <a:p>
+            <a:r>
+              <a:rPr lang="en-US" dirty="0" smtClean="0"/>
+              <a:t>Server scores the model against other foods</a:t>
+            </a:r>
+          </a:p>
+          <a:p>
+            <a:r>
+              <a:rPr lang="en-US" dirty="0" smtClean="0"/>
+              <a:t>Three most likely foods are returned to the user</a:t>
+            </a:r>
+          </a:p>
+          <a:p>
+            <a:r>
+              <a:rPr lang="en-US" dirty="0" smtClean="0"/>
+              <a:t>Based on user input, nutrition facts are returned</a:t>
+            </a:r>
+          </a:p>
+          <a:p>
+            <a:r>
+              <a:rPr lang="en-US" dirty="0" smtClean="0"/>
+              <a:t>User is happy, user gives us money</a:t>
+            </a:r>
           </a:p>
         </p:txBody>
       </p:sp>
     </p:spTree>
     <p:extLst>
       <p:ext uri="{BB962C8B-B14F-4D97-AF65-F5344CB8AC3E}">
-        <p14:creationId xmlns:p14="http://schemas.microsoft.com/office/powerpoint/2010/main" val="3257776774"/>
+        <p14:creationId xmlns:p14="http://schemas.microsoft.com/office/powerpoint/2010/main" xmlns="" val="3257776774"/>
       </p:ext>
     </p:extLst>
   </p:cSld>
@@ -14379,44 +14990,51 @@
             <p:ph type="title"/>
           </p:nvPr>
         </p:nvSpPr>
-        <p:spPr/>
+        <p:spPr>
+          <a:xfrm>
+            <a:off x="990600" y="762000"/>
+            <a:ext cx="7024744" cy="1143000"/>
+          </a:xfrm>
+        </p:spPr>
         <p:txBody>
           <a:bodyPr/>
           <a:lstStyle/>
           <a:p>
             <a:r>
               <a:rPr lang="en-US" dirty="0" smtClean="0"/>
-              <a:t>Demonstration</a:t>
+              <a:t>Client-Side</a:t>
             </a:r>
             <a:endParaRPr lang="en-US" dirty="0"/>
           </a:p>
         </p:txBody>
       </p:sp>
-      <p:sp>
-        <p:nvSpPr>
-          <p:cNvPr id="3" name="Content Placeholder 2"/>
-          <p:cNvSpPr>
-            <a:spLocks noGrp="1"/>
-          </p:cNvSpPr>
-          <p:nvPr>
-            <p:ph idx="1"/>
-          </p:nvPr>
-        </p:nvSpPr>
-        <p:spPr/>
-        <p:txBody>
-          <a:bodyPr/>
-          <a:lstStyle/>
-          <a:p>
-            <a:endParaRPr lang="en-US" dirty="0"/>
-          </a:p>
-        </p:txBody>
-      </p:sp>
+      <p:pic>
+        <p:nvPicPr>
+          <p:cNvPr id="1026" name="Picture 2" descr="C:\Users\bellrj\CSSE376\teamRepo\Documents\Design Docs\Client Class Diagram.png"/>
+          <p:cNvPicPr>
+            <a:picLocks noChangeAspect="1" noChangeArrowheads="1"/>
+          </p:cNvPicPr>
+          <p:nvPr/>
+        </p:nvPicPr>
+        <p:blipFill>
+          <a:blip r:embed="rId2" cstate="print"/>
+          <a:srcRect/>
+          <a:stretch>
+            <a:fillRect/>
+          </a:stretch>
+        </p:blipFill>
+        <p:spPr bwMode="auto">
+          <a:xfrm>
+            <a:off x="2133600" y="2209800"/>
+            <a:ext cx="4097338" cy="3830638"/>
+          </a:xfrm>
+          <a:prstGeom prst="rect">
+            <a:avLst/>
+          </a:prstGeom>
+          <a:noFill/>
+        </p:spPr>
+      </p:pic>
     </p:spTree>
-    <p:extLst>
-      <p:ext uri="{BB962C8B-B14F-4D97-AF65-F5344CB8AC3E}">
-        <p14:creationId xmlns:p14="http://schemas.microsoft.com/office/powerpoint/2010/main" val="868912289"/>
-      </p:ext>
-    </p:extLst>
   </p:cSld>
   <p:clrMapOvr>
     <a:masterClrMapping/>
@@ -14451,44 +15069,51 @@
             <p:ph type="title"/>
           </p:nvPr>
         </p:nvSpPr>
-        <p:spPr/>
+        <p:spPr>
+          <a:xfrm>
+            <a:off x="1066800" y="838200"/>
+            <a:ext cx="7024744" cy="1143000"/>
+          </a:xfrm>
+        </p:spPr>
         <p:txBody>
           <a:bodyPr/>
           <a:lstStyle/>
           <a:p>
             <a:r>
               <a:rPr lang="en-US" dirty="0" smtClean="0"/>
-              <a:t>Test-Driven Development</a:t>
+              <a:t>Server-Side</a:t>
             </a:r>
             <a:endParaRPr lang="en-US" dirty="0"/>
           </a:p>
         </p:txBody>
       </p:sp>
-      <p:sp>
-        <p:nvSpPr>
-          <p:cNvPr id="3" name="Content Placeholder 2"/>
-          <p:cNvSpPr>
-            <a:spLocks noGrp="1"/>
-          </p:cNvSpPr>
-          <p:nvPr>
-            <p:ph idx="1"/>
-          </p:nvPr>
-        </p:nvSpPr>
-        <p:spPr/>
-        <p:txBody>
-          <a:bodyPr/>
-          <a:lstStyle/>
-          <a:p>
-            <a:endParaRPr lang="en-US"/>
-          </a:p>
-        </p:txBody>
-      </p:sp>
+      <p:pic>
+        <p:nvPicPr>
+          <p:cNvPr id="2050" name="Picture 2" descr="C:\Users\bellrj\CSSE376\teamRepo\Documents\Design Docs\Server Class Diagram.png"/>
+          <p:cNvPicPr>
+            <a:picLocks noChangeAspect="1" noChangeArrowheads="1"/>
+          </p:cNvPicPr>
+          <p:nvPr/>
+        </p:nvPicPr>
+        <p:blipFill>
+          <a:blip r:embed="rId2" cstate="print"/>
+          <a:srcRect/>
+          <a:stretch>
+            <a:fillRect/>
+          </a:stretch>
+        </p:blipFill>
+        <p:spPr bwMode="auto">
+          <a:xfrm>
+            <a:off x="2286000" y="2209800"/>
+            <a:ext cx="4240213" cy="3840163"/>
+          </a:xfrm>
+          <a:prstGeom prst="rect">
+            <a:avLst/>
+          </a:prstGeom>
+          <a:noFill/>
+        </p:spPr>
+      </p:pic>
     </p:spTree>
-    <p:extLst>
-      <p:ext uri="{BB962C8B-B14F-4D97-AF65-F5344CB8AC3E}">
-        <p14:creationId xmlns:p14="http://schemas.microsoft.com/office/powerpoint/2010/main" val="1170573321"/>
-      </p:ext>
-    </p:extLst>
   </p:cSld>
   <p:clrMapOvr>
     <a:masterClrMapping/>
@@ -14523,44 +15148,51 @@
             <p:ph type="title"/>
           </p:nvPr>
         </p:nvSpPr>
-        <p:spPr/>
+        <p:spPr>
+          <a:xfrm>
+            <a:off x="990600" y="762000"/>
+            <a:ext cx="7024744" cy="646664"/>
+          </a:xfrm>
+        </p:spPr>
         <p:txBody>
-          <a:bodyPr/>
+          <a:bodyPr>
+            <a:normAutofit fontScale="90000"/>
+          </a:bodyPr>
           <a:lstStyle/>
           <a:p>
             <a:r>
               <a:rPr lang="en-US" dirty="0" smtClean="0"/>
-              <a:t>Metrics</a:t>
+              <a:t>Relevant Diagram</a:t>
             </a:r>
             <a:endParaRPr lang="en-US" dirty="0"/>
           </a:p>
         </p:txBody>
       </p:sp>
-      <p:sp>
-        <p:nvSpPr>
-          <p:cNvPr id="3" name="Content Placeholder 2"/>
-          <p:cNvSpPr>
-            <a:spLocks noGrp="1"/>
-          </p:cNvSpPr>
-          <p:nvPr>
-            <p:ph idx="1"/>
-          </p:nvPr>
-        </p:nvSpPr>
-        <p:spPr/>
-        <p:txBody>
-          <a:bodyPr/>
-          <a:lstStyle/>
-          <a:p>
-            <a:endParaRPr lang="en-US"/>
-          </a:p>
-        </p:txBody>
-      </p:sp>
+      <p:pic>
+        <p:nvPicPr>
+          <p:cNvPr id="4" name="Picture 3" descr="HotSexyLadies.png"/>
+          <p:cNvPicPr>
+            <a:picLocks noChangeAspect="1"/>
+          </p:cNvPicPr>
+          <p:nvPr/>
+        </p:nvPicPr>
+        <p:blipFill>
+          <a:blip r:embed="rId2" cstate="print"/>
+          <a:stretch>
+            <a:fillRect/>
+          </a:stretch>
+        </p:blipFill>
+        <p:spPr>
+          <a:xfrm>
+            <a:off x="838200" y="1371600"/>
+            <a:ext cx="6982800" cy="5029902"/>
+          </a:xfrm>
+          <a:prstGeom prst="rect">
+            <a:avLst/>
+          </a:prstGeom>
+        </p:spPr>
+      </p:pic>
     </p:spTree>
-    <p:extLst>
-      <p:ext uri="{BB962C8B-B14F-4D97-AF65-F5344CB8AC3E}">
-        <p14:creationId xmlns:p14="http://schemas.microsoft.com/office/powerpoint/2010/main" val="2301795302"/>
-      </p:ext>
-    </p:extLst>
   </p:cSld>
   <p:clrMapOvr>
     <a:masterClrMapping/>
@@ -14602,7 +15234,7 @@
           <a:p>
             <a:r>
               <a:rPr lang="en-US" dirty="0" smtClean="0"/>
-              <a:t>Metrics</a:t>
+              <a:t>Test-Driven Development</a:t>
             </a:r>
             <a:endParaRPr lang="en-US" dirty="0"/>
           </a:p>
@@ -14623,14 +15255,36 @@
           <a:bodyPr/>
           <a:lstStyle/>
           <a:p>
-            <a:endParaRPr lang="en-US"/>
+            <a:r>
+              <a:rPr lang="en-US" dirty="0" smtClean="0"/>
+              <a:t>Struggled with it quite a bit</a:t>
+            </a:r>
+          </a:p>
+          <a:p>
+            <a:r>
+              <a:rPr lang="en-US" dirty="0" smtClean="0"/>
+              <a:t>Often difficult to write tests when we weren’t sure what tools we were going to use</a:t>
+            </a:r>
+          </a:p>
+          <a:p>
+            <a:r>
+              <a:rPr lang="en-US" dirty="0" smtClean="0"/>
+              <a:t>When we buckled down toward the end and did TDD it worked well</a:t>
+            </a:r>
+          </a:p>
+          <a:p>
+            <a:r>
+              <a:rPr lang="en-US" dirty="0" smtClean="0"/>
+              <a:t>Would have probably been a better TDD experience if we had been more diligent</a:t>
+            </a:r>
+            <a:endParaRPr lang="en-US" dirty="0"/>
           </a:p>
         </p:txBody>
       </p:sp>
     </p:spTree>
     <p:extLst>
       <p:ext uri="{BB962C8B-B14F-4D97-AF65-F5344CB8AC3E}">
-        <p14:creationId xmlns:p14="http://schemas.microsoft.com/office/powerpoint/2010/main" val="2014357248"/>
+        <p14:creationId xmlns:p14="http://schemas.microsoft.com/office/powerpoint/2010/main" xmlns="" val="1170573321"/>
       </p:ext>
     </p:extLst>
   </p:cSld>
@@ -14924,4 +15578,287 @@
   <a:objectDefaults/>
   <a:extraClrSchemeLst/>
 </a:theme>
+</file>
+
+<file path=ppt/theme/theme2.xml><?xml version="1.0" encoding="utf-8"?>
+<a:theme xmlns:a="http://schemas.openxmlformats.org/drawingml/2006/main" name="Office Theme">
+  <a:themeElements>
+    <a:clrScheme name="Office">
+      <a:dk1>
+        <a:sysClr val="windowText" lastClr="000000"/>
+      </a:dk1>
+      <a:lt1>
+        <a:sysClr val="window" lastClr="FFFFFF"/>
+      </a:lt1>
+      <a:dk2>
+        <a:srgbClr val="1F497D"/>
+      </a:dk2>
+      <a:lt2>
+        <a:srgbClr val="EEECE1"/>
+      </a:lt2>
+      <a:accent1>
+        <a:srgbClr val="4F81BD"/>
+      </a:accent1>
+      <a:accent2>
+        <a:srgbClr val="C0504D"/>
+      </a:accent2>
+      <a:accent3>
+        <a:srgbClr val="9BBB59"/>
+      </a:accent3>
+      <a:accent4>
+        <a:srgbClr val="8064A2"/>
+      </a:accent4>
+      <a:accent5>
+        <a:srgbClr val="4BACC6"/>
+      </a:accent5>
+      <a:accent6>
+        <a:srgbClr val="F79646"/>
+      </a:accent6>
+      <a:hlink>
+        <a:srgbClr val="0000FF"/>
+      </a:hlink>
+      <a:folHlink>
+        <a:srgbClr val="800080"/>
+      </a:folHlink>
+    </a:clrScheme>
+    <a:fontScheme name="Office">
+      <a:majorFont>
+        <a:latin typeface="Calibri"/>
+        <a:ea typeface=""/>
+        <a:cs typeface=""/>
+        <a:font script="Jpan" typeface="ＭＳ Ｐゴシック"/>
+        <a:font script="Hang" typeface="맑은 고딕"/>
+        <a:font script="Hans" typeface="宋体"/>
+        <a:font script="Hant" typeface="新細明體"/>
+        <a:font script="Arab" typeface="Times New Roman"/>
+        <a:font script="Hebr" typeface="Times New Roman"/>
+        <a:font script="Thai" typeface="Angsana New"/>
+        <a:font script="Ethi" typeface="Nyala"/>
+        <a:font script="Beng" typeface="Vrinda"/>
+        <a:font script="Gujr" typeface="Shruti"/>
+        <a:font script="Khmr" typeface="MoolBoran"/>
+        <a:font script="Knda" typeface="Tunga"/>
+        <a:font script="Guru" typeface="Raavi"/>
+        <a:font script="Cans" typeface="Euphemia"/>
+        <a:font script="Cher" typeface="Plantagenet Cherokee"/>
+        <a:font script="Yiii" typeface="Microsoft Yi Baiti"/>
+        <a:font script="Tibt" typeface="Microsoft Himalaya"/>
+        <a:font script="Thaa" typeface="MV Boli"/>
+        <a:font script="Deva" typeface="Mangal"/>
+        <a:font script="Telu" typeface="Gautami"/>
+        <a:font script="Taml" typeface="Latha"/>
+        <a:font script="Syrc" typeface="Estrangelo Edessa"/>
+        <a:font script="Orya" typeface="Kalinga"/>
+        <a:font script="Mlym" typeface="Kartika"/>
+        <a:font script="Laoo" typeface="DokChampa"/>
+        <a:font script="Sinh" typeface="Iskoola Pota"/>
+        <a:font script="Mong" typeface="Mongolian Baiti"/>
+        <a:font script="Viet" typeface="Times New Roman"/>
+        <a:font script="Uigh" typeface="Microsoft Uighur"/>
+      </a:majorFont>
+      <a:minorFont>
+        <a:latin typeface="Calibri"/>
+        <a:ea typeface=""/>
+        <a:cs typeface=""/>
+        <a:font script="Jpan" typeface="ＭＳ Ｐゴシック"/>
+        <a:font script="Hang" typeface="맑은 고딕"/>
+        <a:font script="Hans" typeface="宋体"/>
+        <a:font script="Hant" typeface="新細明體"/>
+        <a:font script="Arab" typeface="Arial"/>
+        <a:font script="Hebr" typeface="Arial"/>
+        <a:font script="Thai" typeface="Cordia New"/>
+        <a:font script="Ethi" typeface="Nyala"/>
+        <a:font script="Beng" typeface="Vrinda"/>
+        <a:font script="Gujr" typeface="Shruti"/>
+        <a:font script="Khmr" typeface="DaunPenh"/>
+        <a:font script="Knda" typeface="Tunga"/>
+        <a:font script="Guru" typeface="Raavi"/>
+        <a:font script="Cans" typeface="Euphemia"/>
+        <a:font script="Cher" typeface="Plantagenet Cherokee"/>
+        <a:font script="Yiii" typeface="Microsoft Yi Baiti"/>
+        <a:font script="Tibt" typeface="Microsoft Himalaya"/>
+        <a:font script="Thaa" typeface="MV Boli"/>
+        <a:font script="Deva" typeface="Mangal"/>
+        <a:font script="Telu" typeface="Gautami"/>
+        <a:font script="Taml" typeface="Latha"/>
+        <a:font script="Syrc" typeface="Estrangelo Edessa"/>
+        <a:font script="Orya" typeface="Kalinga"/>
+        <a:font script="Mlym" typeface="Kartika"/>
+        <a:font script="Laoo" typeface="DokChampa"/>
+        <a:font script="Sinh" typeface="Iskoola Pota"/>
+        <a:font script="Mong" typeface="Mongolian Baiti"/>
+        <a:font script="Viet" typeface="Arial"/>
+        <a:font script="Uigh" typeface="Microsoft Uighur"/>
+      </a:minorFont>
+    </a:fontScheme>
+    <a:fmtScheme name="Office">
+      <a:fillStyleLst>
+        <a:solidFill>
+          <a:schemeClr val="phClr"/>
+        </a:solidFill>
+        <a:gradFill rotWithShape="1">
+          <a:gsLst>
+            <a:gs pos="0">
+              <a:schemeClr val="phClr">
+                <a:tint val="50000"/>
+                <a:satMod val="300000"/>
+              </a:schemeClr>
+            </a:gs>
+            <a:gs pos="35000">
+              <a:schemeClr val="phClr">
+                <a:tint val="37000"/>
+                <a:satMod val="300000"/>
+              </a:schemeClr>
+            </a:gs>
+            <a:gs pos="100000">
+              <a:schemeClr val="phClr">
+                <a:tint val="15000"/>
+                <a:satMod val="350000"/>
+              </a:schemeClr>
+            </a:gs>
+          </a:gsLst>
+          <a:lin ang="16200000" scaled="1"/>
+        </a:gradFill>
+        <a:gradFill rotWithShape="1">
+          <a:gsLst>
+            <a:gs pos="0">
+              <a:schemeClr val="phClr">
+                <a:shade val="51000"/>
+                <a:satMod val="130000"/>
+              </a:schemeClr>
+            </a:gs>
+            <a:gs pos="80000">
+              <a:schemeClr val="phClr">
+                <a:shade val="93000"/>
+                <a:satMod val="130000"/>
+              </a:schemeClr>
+            </a:gs>
+            <a:gs pos="100000">
+              <a:schemeClr val="phClr">
+                <a:shade val="94000"/>
+                <a:satMod val="135000"/>
+              </a:schemeClr>
+            </a:gs>
+          </a:gsLst>
+          <a:lin ang="16200000" scaled="0"/>
+        </a:gradFill>
+      </a:fillStyleLst>
+      <a:lnStyleLst>
+        <a:ln w="9525" cap="flat" cmpd="sng" algn="ctr">
+          <a:solidFill>
+            <a:schemeClr val="phClr">
+              <a:shade val="95000"/>
+              <a:satMod val="105000"/>
+            </a:schemeClr>
+          </a:solidFill>
+          <a:prstDash val="solid"/>
+        </a:ln>
+        <a:ln w="25400" cap="flat" cmpd="sng" algn="ctr">
+          <a:solidFill>
+            <a:schemeClr val="phClr"/>
+          </a:solidFill>
+          <a:prstDash val="solid"/>
+        </a:ln>
+        <a:ln w="38100" cap="flat" cmpd="sng" algn="ctr">
+          <a:solidFill>
+            <a:schemeClr val="phClr"/>
+          </a:solidFill>
+          <a:prstDash val="solid"/>
+        </a:ln>
+      </a:lnStyleLst>
+      <a:effectStyleLst>
+        <a:effectStyle>
+          <a:effectLst>
+            <a:outerShdw blurRad="40000" dist="20000" dir="5400000" rotWithShape="0">
+              <a:srgbClr val="000000">
+                <a:alpha val="38000"/>
+              </a:srgbClr>
+            </a:outerShdw>
+          </a:effectLst>
+        </a:effectStyle>
+        <a:effectStyle>
+          <a:effectLst>
+            <a:outerShdw blurRad="40000" dist="23000" dir="5400000" rotWithShape="0">
+              <a:srgbClr val="000000">
+                <a:alpha val="35000"/>
+              </a:srgbClr>
+            </a:outerShdw>
+          </a:effectLst>
+        </a:effectStyle>
+        <a:effectStyle>
+          <a:effectLst>
+            <a:outerShdw blurRad="40000" dist="23000" dir="5400000" rotWithShape="0">
+              <a:srgbClr val="000000">
+                <a:alpha val="35000"/>
+              </a:srgbClr>
+            </a:outerShdw>
+          </a:effectLst>
+          <a:scene3d>
+            <a:camera prst="orthographicFront">
+              <a:rot lat="0" lon="0" rev="0"/>
+            </a:camera>
+            <a:lightRig rig="threePt" dir="t">
+              <a:rot lat="0" lon="0" rev="1200000"/>
+            </a:lightRig>
+          </a:scene3d>
+          <a:sp3d>
+            <a:bevelT w="63500" h="25400"/>
+          </a:sp3d>
+        </a:effectStyle>
+      </a:effectStyleLst>
+      <a:bgFillStyleLst>
+        <a:solidFill>
+          <a:schemeClr val="phClr"/>
+        </a:solidFill>
+        <a:gradFill rotWithShape="1">
+          <a:gsLst>
+            <a:gs pos="0">
+              <a:schemeClr val="phClr">
+                <a:tint val="40000"/>
+                <a:satMod val="350000"/>
+              </a:schemeClr>
+            </a:gs>
+            <a:gs pos="40000">
+              <a:schemeClr val="phClr">
+                <a:tint val="45000"/>
+                <a:shade val="99000"/>
+                <a:satMod val="350000"/>
+              </a:schemeClr>
+            </a:gs>
+            <a:gs pos="100000">
+              <a:schemeClr val="phClr">
+                <a:shade val="20000"/>
+                <a:satMod val="255000"/>
+              </a:schemeClr>
+            </a:gs>
+          </a:gsLst>
+          <a:path path="circle">
+            <a:fillToRect l="50000" t="-80000" r="50000" b="180000"/>
+          </a:path>
+        </a:gradFill>
+        <a:gradFill rotWithShape="1">
+          <a:gsLst>
+            <a:gs pos="0">
+              <a:schemeClr val="phClr">
+                <a:tint val="80000"/>
+                <a:satMod val="300000"/>
+              </a:schemeClr>
+            </a:gs>
+            <a:gs pos="100000">
+              <a:schemeClr val="phClr">
+                <a:shade val="30000"/>
+                <a:satMod val="200000"/>
+              </a:schemeClr>
+            </a:gs>
+          </a:gsLst>
+          <a:path path="circle">
+            <a:fillToRect l="50000" t="50000" r="50000" b="50000"/>
+          </a:path>
+        </a:gradFill>
+      </a:bgFillStyleLst>
+    </a:fmtScheme>
+  </a:themeElements>
+  <a:objectDefaults/>
+  <a:extraClrSchemeLst/>
+</a:theme>
 </file>
</xml_diff>